<commit_message>
all but multi-threaded test cases...
</commit_message>
<xml_diff>
--- a/classes/prog2016/Prog3-Lecture20.pptx
+++ b/classes/prog2016/Prog3-Lecture20.pptx
@@ -5,7 +5,7 @@
     <p:sldMasterId id="2147483648" r:id="rId1"/>
   </p:sldMasterIdLst>
   <p:notesMasterIdLst>
-    <p:notesMasterId r:id="rId31"/>
+    <p:notesMasterId r:id="rId34"/>
   </p:notesMasterIdLst>
   <p:sldIdLst>
     <p:sldId id="256" r:id="rId2"/>
@@ -37,6 +37,9 @@
     <p:sldId id="283" r:id="rId28"/>
     <p:sldId id="284" r:id="rId29"/>
     <p:sldId id="285" r:id="rId30"/>
+    <p:sldId id="286" r:id="rId31"/>
+    <p:sldId id="287" r:id="rId32"/>
+    <p:sldId id="288" r:id="rId33"/>
   </p:sldIdLst>
   <p:sldSz cx="12192000" cy="6858000"/>
   <p:notesSz cx="6858000" cy="9144000"/>
@@ -225,7 +228,7 @@
           <a:p>
             <a:fld id="{4756FA89-8905-48F4-85A6-F8FF8001D8A6}" type="datetimeFigureOut">
               <a:rPr lang="en-US" smtClean="0"/>
-              <a:t>11/17/2016</a:t>
+              <a:t>11/18/2016</a:t>
             </a:fld>
             <a:endParaRPr lang="en-US"/>
           </a:p>
@@ -1066,7 +1069,7 @@
           <a:p>
             <a:fld id="{B97E2F78-2D7A-422E-BC7A-E1AE5016E117}" type="datetimeFigureOut">
               <a:rPr lang="en-US" smtClean="0"/>
-              <a:t>11/17/2016</a:t>
+              <a:t>11/18/2016</a:t>
             </a:fld>
             <a:endParaRPr lang="en-US"/>
           </a:p>
@@ -1234,7 +1237,7 @@
           <a:p>
             <a:fld id="{B97E2F78-2D7A-422E-BC7A-E1AE5016E117}" type="datetimeFigureOut">
               <a:rPr lang="en-US" smtClean="0"/>
-              <a:t>11/17/2016</a:t>
+              <a:t>11/18/2016</a:t>
             </a:fld>
             <a:endParaRPr lang="en-US"/>
           </a:p>
@@ -1412,7 +1415,7 @@
           <a:p>
             <a:fld id="{B97E2F78-2D7A-422E-BC7A-E1AE5016E117}" type="datetimeFigureOut">
               <a:rPr lang="en-US" smtClean="0"/>
-              <a:t>11/17/2016</a:t>
+              <a:t>11/18/2016</a:t>
             </a:fld>
             <a:endParaRPr lang="en-US"/>
           </a:p>
@@ -1580,7 +1583,7 @@
           <a:p>
             <a:fld id="{B97E2F78-2D7A-422E-BC7A-E1AE5016E117}" type="datetimeFigureOut">
               <a:rPr lang="en-US" smtClean="0"/>
-              <a:t>11/17/2016</a:t>
+              <a:t>11/18/2016</a:t>
             </a:fld>
             <a:endParaRPr lang="en-US"/>
           </a:p>
@@ -1825,7 +1828,7 @@
           <a:p>
             <a:fld id="{B97E2F78-2D7A-422E-BC7A-E1AE5016E117}" type="datetimeFigureOut">
               <a:rPr lang="en-US" smtClean="0"/>
-              <a:t>11/17/2016</a:t>
+              <a:t>11/18/2016</a:t>
             </a:fld>
             <a:endParaRPr lang="en-US"/>
           </a:p>
@@ -2054,7 +2057,7 @@
           <a:p>
             <a:fld id="{B97E2F78-2D7A-422E-BC7A-E1AE5016E117}" type="datetimeFigureOut">
               <a:rPr lang="en-US" smtClean="0"/>
-              <a:t>11/17/2016</a:t>
+              <a:t>11/18/2016</a:t>
             </a:fld>
             <a:endParaRPr lang="en-US"/>
           </a:p>
@@ -2418,7 +2421,7 @@
           <a:p>
             <a:fld id="{B97E2F78-2D7A-422E-BC7A-E1AE5016E117}" type="datetimeFigureOut">
               <a:rPr lang="en-US" smtClean="0"/>
-              <a:t>11/17/2016</a:t>
+              <a:t>11/18/2016</a:t>
             </a:fld>
             <a:endParaRPr lang="en-US"/>
           </a:p>
@@ -2535,7 +2538,7 @@
           <a:p>
             <a:fld id="{B97E2F78-2D7A-422E-BC7A-E1AE5016E117}" type="datetimeFigureOut">
               <a:rPr lang="en-US" smtClean="0"/>
-              <a:t>11/17/2016</a:t>
+              <a:t>11/18/2016</a:t>
             </a:fld>
             <a:endParaRPr lang="en-US"/>
           </a:p>
@@ -2630,7 +2633,7 @@
           <a:p>
             <a:fld id="{B97E2F78-2D7A-422E-BC7A-E1AE5016E117}" type="datetimeFigureOut">
               <a:rPr lang="en-US" smtClean="0"/>
-              <a:t>11/17/2016</a:t>
+              <a:t>11/18/2016</a:t>
             </a:fld>
             <a:endParaRPr lang="en-US"/>
           </a:p>
@@ -2905,7 +2908,7 @@
           <a:p>
             <a:fld id="{B97E2F78-2D7A-422E-BC7A-E1AE5016E117}" type="datetimeFigureOut">
               <a:rPr lang="en-US" smtClean="0"/>
-              <a:t>11/17/2016</a:t>
+              <a:t>11/18/2016</a:t>
             </a:fld>
             <a:endParaRPr lang="en-US"/>
           </a:p>
@@ -3157,7 +3160,7 @@
           <a:p>
             <a:fld id="{B97E2F78-2D7A-422E-BC7A-E1AE5016E117}" type="datetimeFigureOut">
               <a:rPr lang="en-US" smtClean="0"/>
-              <a:t>11/17/2016</a:t>
+              <a:t>11/18/2016</a:t>
             </a:fld>
             <a:endParaRPr lang="en-US"/>
           </a:p>
@@ -3368,7 +3371,7 @@
           <a:p>
             <a:fld id="{B97E2F78-2D7A-422E-BC7A-E1AE5016E117}" type="datetimeFigureOut">
               <a:rPr lang="en-US" smtClean="0"/>
-              <a:t>11/17/2016</a:t>
+              <a:t>11/18/2016</a:t>
             </a:fld>
             <a:endParaRPr lang="en-US"/>
           </a:p>
@@ -5754,7 +5757,7 @@
           <a:graphicData uri="http://schemas.openxmlformats.org/presentationml/2006/ole">
             <mc:AlternateContent xmlns:mc="http://schemas.openxmlformats.org/markup-compatibility/2006">
               <mc:Choice xmlns:v="urn:schemas-microsoft-com:vml" Requires="v">
-                <p:oleObj spid="_x0000_s1034" name="Bitmap Image" r:id="rId4" imgW="4361905" imgH="2905531" progId="Paint.Picture">
+                <p:oleObj spid="_x0000_s1045" name="Bitmap Image" r:id="rId4" imgW="4361905" imgH="2905531" progId="Paint.Picture">
                   <p:embed/>
                 </p:oleObj>
               </mc:Choice>
@@ -5979,7 +5982,7 @@
           <a:graphicData uri="http://schemas.openxmlformats.org/presentationml/2006/ole">
             <mc:AlternateContent xmlns:mc="http://schemas.openxmlformats.org/markup-compatibility/2006">
               <mc:Choice xmlns:v="urn:schemas-microsoft-com:vml" Requires="v">
-                <p:oleObj spid="_x0000_s2058" name="Bitmap Image" r:id="rId4" imgW="6533333" imgH="5057143" progId="Paint.Picture">
+                <p:oleObj spid="_x0000_s2069" name="Bitmap Image" r:id="rId4" imgW="6533333" imgH="5057143" progId="Paint.Picture">
                   <p:embed/>
                 </p:oleObj>
               </mc:Choice>
@@ -6165,7 +6168,7 @@
           <a:graphicData uri="http://schemas.openxmlformats.org/presentationml/2006/ole">
             <mc:AlternateContent xmlns:mc="http://schemas.openxmlformats.org/markup-compatibility/2006">
               <mc:Choice xmlns:v="urn:schemas-microsoft-com:vml" Requires="v">
-                <p:oleObj spid="_x0000_s3082" name="Bitmap Image" r:id="rId4" imgW="7935433" imgH="4067743" progId="Paint.Picture">
+                <p:oleObj spid="_x0000_s3093" name="Bitmap Image" r:id="rId4" imgW="7935433" imgH="4067743" progId="Paint.Picture">
                   <p:embed/>
                 </p:oleObj>
               </mc:Choice>
@@ -6351,7 +6354,7 @@
           <a:graphicData uri="http://schemas.openxmlformats.org/presentationml/2006/ole">
             <mc:AlternateContent xmlns:mc="http://schemas.openxmlformats.org/markup-compatibility/2006">
               <mc:Choice xmlns:v="urn:schemas-microsoft-com:vml" Requires="v">
-                <p:oleObj spid="_x0000_s4106" name="Bitmap Image" r:id="rId4" imgW="6628571" imgH="6552381" progId="Paint.Picture">
+                <p:oleObj spid="_x0000_s4117" name="Bitmap Image" r:id="rId4" imgW="6628571" imgH="6552381" progId="Paint.Picture">
                   <p:embed/>
                 </p:oleObj>
               </mc:Choice>
@@ -6979,6 +6982,520 @@
     <p:extLst>
       <p:ext uri="{BB962C8B-B14F-4D97-AF65-F5344CB8AC3E}">
         <p14:creationId xmlns:p14="http://schemas.microsoft.com/office/powerpoint/2010/main" val="32555172"/>
+      </p:ext>
+    </p:extLst>
+  </p:cSld>
+  <p:clrMapOvr>
+    <a:masterClrMapping/>
+  </p:clrMapOvr>
+</p:sld>
+</file>
+
+<file path=ppt/slides/slide30.xml><?xml version="1.0" encoding="utf-8"?>
+<p:sld xmlns:a="http://schemas.openxmlformats.org/drawingml/2006/main" xmlns:r="http://schemas.openxmlformats.org/officeDocument/2006/relationships" xmlns:p="http://schemas.openxmlformats.org/presentationml/2006/main">
+  <p:cSld>
+    <p:spTree>
+      <p:nvGrpSpPr>
+        <p:cNvPr id="1" name=""/>
+        <p:cNvGrpSpPr/>
+        <p:nvPr/>
+      </p:nvGrpSpPr>
+      <p:grpSpPr>
+        <a:xfrm>
+          <a:off x="0" y="0"/>
+          <a:ext cx="0" cy="0"/>
+          <a:chOff x="0" y="0"/>
+          <a:chExt cx="0" cy="0"/>
+        </a:xfrm>
+      </p:grpSpPr>
+      <p:pic>
+        <p:nvPicPr>
+          <p:cNvPr id="3" name="Picture 2"/>
+          <p:cNvPicPr>
+            <a:picLocks noChangeAspect="1"/>
+          </p:cNvPicPr>
+          <p:nvPr/>
+        </p:nvPicPr>
+        <p:blipFill>
+          <a:blip r:embed="rId2"/>
+          <a:stretch>
+            <a:fillRect/>
+          </a:stretch>
+        </p:blipFill>
+        <p:spPr>
+          <a:xfrm>
+            <a:off x="787667" y="262055"/>
+            <a:ext cx="8170879" cy="6138148"/>
+          </a:xfrm>
+          <a:prstGeom prst="rect">
+            <a:avLst/>
+          </a:prstGeom>
+        </p:spPr>
+      </p:pic>
+      <p:sp>
+        <p:nvSpPr>
+          <p:cNvPr id="5" name="TextBox 4"/>
+          <p:cNvSpPr txBox="1"/>
+          <p:nvPr/>
+        </p:nvSpPr>
+        <p:spPr>
+          <a:xfrm>
+            <a:off x="401320" y="-35560"/>
+            <a:ext cx="6811737" cy="369332"/>
+          </a:xfrm>
+          <a:prstGeom prst="rect">
+            <a:avLst/>
+          </a:prstGeom>
+          <a:noFill/>
+        </p:spPr>
+        <p:txBody>
+          <a:bodyPr wrap="none" rtlCol="0">
+            <a:spAutoFit/>
+          </a:bodyPr>
+          <a:lstStyle/>
+          <a:p>
+            <a:r>
+              <a:rPr lang="en-US" dirty="0"/>
+              <a:t>In section 12.1, the book introduces a </a:t>
+            </a:r>
+            <a:r>
+              <a:rPr lang="en-US" dirty="0" err="1"/>
+              <a:t>BoundedBuffer</a:t>
+            </a:r>
+            <a:r>
+              <a:rPr lang="en-US" dirty="0"/>
+              <a:t> class for testing…</a:t>
+            </a:r>
+          </a:p>
+        </p:txBody>
+      </p:sp>
+      <p:cxnSp>
+        <p:nvCxnSpPr>
+          <p:cNvPr id="8" name="Straight Connector 7"/>
+          <p:cNvCxnSpPr/>
+          <p:nvPr/>
+        </p:nvCxnSpPr>
+        <p:spPr>
+          <a:xfrm>
+            <a:off x="6944659" y="729129"/>
+            <a:ext cx="0" cy="5623859"/>
+          </a:xfrm>
+          <a:prstGeom prst="line">
+            <a:avLst/>
+          </a:prstGeom>
+        </p:spPr>
+        <p:style>
+          <a:lnRef idx="1">
+            <a:schemeClr val="accent1"/>
+          </a:lnRef>
+          <a:fillRef idx="0">
+            <a:schemeClr val="accent1"/>
+          </a:fillRef>
+          <a:effectRef idx="0">
+            <a:schemeClr val="accent1"/>
+          </a:effectRef>
+          <a:fontRef idx="minor">
+            <a:schemeClr val="tx1"/>
+          </a:fontRef>
+        </p:style>
+      </p:cxnSp>
+      <p:pic>
+        <p:nvPicPr>
+          <p:cNvPr id="9" name="Picture 8"/>
+          <p:cNvPicPr>
+            <a:picLocks noChangeAspect="1"/>
+          </p:cNvPicPr>
+          <p:nvPr/>
+        </p:nvPicPr>
+        <p:blipFill>
+          <a:blip r:embed="rId3"/>
+          <a:stretch>
+            <a:fillRect/>
+          </a:stretch>
+        </p:blipFill>
+        <p:spPr>
+          <a:xfrm>
+            <a:off x="7043683" y="790375"/>
+            <a:ext cx="4975597" cy="2976236"/>
+          </a:xfrm>
+          <a:prstGeom prst="rect">
+            <a:avLst/>
+          </a:prstGeom>
+        </p:spPr>
+      </p:pic>
+      <p:sp>
+        <p:nvSpPr>
+          <p:cNvPr id="10" name="Rectangle 9"/>
+          <p:cNvSpPr/>
+          <p:nvPr/>
+        </p:nvSpPr>
+        <p:spPr>
+          <a:xfrm>
+            <a:off x="76200" y="6511976"/>
+            <a:ext cx="12227560" cy="276999"/>
+          </a:xfrm>
+          <a:prstGeom prst="rect">
+            <a:avLst/>
+          </a:prstGeom>
+        </p:spPr>
+        <p:txBody>
+          <a:bodyPr wrap="square">
+            <a:spAutoFit/>
+          </a:bodyPr>
+          <a:lstStyle/>
+          <a:p>
+            <a:r>
+              <a:rPr lang="en-US" sz="1200" dirty="0">
+                <a:latin typeface="Arial" panose="020B0604020202020204" pitchFamily="34" charset="0"/>
+                <a:cs typeface="Arial" panose="020B0604020202020204" pitchFamily="34" charset="0"/>
+              </a:rPr>
+              <a:t>https://github.com/afodor/metagenomicsTools/blob/master/src/classExamples/boundedBuffer/SemaphoreBoundedBuffer.java</a:t>
+            </a:r>
+            <a:endParaRPr lang="en-US" sz="1200" dirty="0">
+              <a:latin typeface="Arial" panose="020B0604020202020204" pitchFamily="34" charset="0"/>
+              <a:cs typeface="Arial" panose="020B0604020202020204" pitchFamily="34" charset="0"/>
+            </a:endParaRPr>
+          </a:p>
+        </p:txBody>
+      </p:sp>
+    </p:spTree>
+    <p:extLst>
+      <p:ext uri="{BB962C8B-B14F-4D97-AF65-F5344CB8AC3E}">
+        <p14:creationId xmlns:p14="http://schemas.microsoft.com/office/powerpoint/2010/main" val="3048140477"/>
+      </p:ext>
+    </p:extLst>
+  </p:cSld>
+  <p:clrMapOvr>
+    <a:masterClrMapping/>
+  </p:clrMapOvr>
+</p:sld>
+</file>
+
+<file path=ppt/slides/slide31.xml><?xml version="1.0" encoding="utf-8"?>
+<p:sld xmlns:a="http://schemas.openxmlformats.org/drawingml/2006/main" xmlns:r="http://schemas.openxmlformats.org/officeDocument/2006/relationships" xmlns:p="http://schemas.openxmlformats.org/presentationml/2006/main">
+  <p:cSld>
+    <p:spTree>
+      <p:nvGrpSpPr>
+        <p:cNvPr id="1" name=""/>
+        <p:cNvGrpSpPr/>
+        <p:nvPr/>
+      </p:nvGrpSpPr>
+      <p:grpSpPr>
+        <a:xfrm>
+          <a:off x="0" y="0"/>
+          <a:ext cx="0" cy="0"/>
+          <a:chOff x="0" y="0"/>
+          <a:chExt cx="0" cy="0"/>
+        </a:xfrm>
+      </p:grpSpPr>
+      <p:sp>
+        <p:nvSpPr>
+          <p:cNvPr id="2" name="TextBox 1"/>
+          <p:cNvSpPr txBox="1"/>
+          <p:nvPr/>
+        </p:nvSpPr>
+        <p:spPr>
+          <a:xfrm>
+            <a:off x="690880" y="213360"/>
+            <a:ext cx="5156220" cy="369332"/>
+          </a:xfrm>
+          <a:prstGeom prst="rect">
+            <a:avLst/>
+          </a:prstGeom>
+          <a:noFill/>
+        </p:spPr>
+        <p:txBody>
+          <a:bodyPr wrap="none" rtlCol="0">
+            <a:spAutoFit/>
+          </a:bodyPr>
+          <a:lstStyle/>
+          <a:p>
+            <a:r>
+              <a:rPr lang="en-US" dirty="0">
+                <a:latin typeface="Arial" panose="020B0604020202020204" pitchFamily="34" charset="0"/>
+                <a:cs typeface="Arial" panose="020B0604020202020204" pitchFamily="34" charset="0"/>
+              </a:rPr>
+              <a:t>We can do some informal testing (just by eye….)</a:t>
+            </a:r>
+          </a:p>
+        </p:txBody>
+      </p:sp>
+      <p:pic>
+        <p:nvPicPr>
+          <p:cNvPr id="3" name="Picture 2"/>
+          <p:cNvPicPr>
+            <a:picLocks noChangeAspect="1"/>
+          </p:cNvPicPr>
+          <p:nvPr/>
+        </p:nvPicPr>
+        <p:blipFill>
+          <a:blip r:embed="rId2"/>
+          <a:stretch>
+            <a:fillRect/>
+          </a:stretch>
+        </p:blipFill>
+        <p:spPr>
+          <a:xfrm>
+            <a:off x="101600" y="710272"/>
+            <a:ext cx="10237694" cy="3752871"/>
+          </a:xfrm>
+          <a:prstGeom prst="rect">
+            <a:avLst/>
+          </a:prstGeom>
+        </p:spPr>
+      </p:pic>
+      <p:pic>
+        <p:nvPicPr>
+          <p:cNvPr id="4" name="Picture 3"/>
+          <p:cNvPicPr>
+            <a:picLocks noChangeAspect="1"/>
+          </p:cNvPicPr>
+          <p:nvPr/>
+        </p:nvPicPr>
+        <p:blipFill>
+          <a:blip r:embed="rId3"/>
+          <a:stretch>
+            <a:fillRect/>
+          </a:stretch>
+        </p:blipFill>
+        <p:spPr>
+          <a:xfrm>
+            <a:off x="7800694" y="2177115"/>
+            <a:ext cx="2717894" cy="3684935"/>
+          </a:xfrm>
+          <a:prstGeom prst="rect">
+            <a:avLst/>
+          </a:prstGeom>
+        </p:spPr>
+      </p:pic>
+    </p:spTree>
+    <p:extLst>
+      <p:ext uri="{BB962C8B-B14F-4D97-AF65-F5344CB8AC3E}">
+        <p14:creationId xmlns:p14="http://schemas.microsoft.com/office/powerpoint/2010/main" val="4175978958"/>
+      </p:ext>
+    </p:extLst>
+  </p:cSld>
+  <p:clrMapOvr>
+    <a:masterClrMapping/>
+  </p:clrMapOvr>
+</p:sld>
+</file>
+
+<file path=ppt/slides/slide32.xml><?xml version="1.0" encoding="utf-8"?>
+<p:sld xmlns:a="http://schemas.openxmlformats.org/drawingml/2006/main" xmlns:r="http://schemas.openxmlformats.org/officeDocument/2006/relationships" xmlns:p="http://schemas.openxmlformats.org/presentationml/2006/main">
+  <p:cSld>
+    <p:spTree>
+      <p:nvGrpSpPr>
+        <p:cNvPr id="1" name=""/>
+        <p:cNvGrpSpPr/>
+        <p:nvPr/>
+      </p:nvGrpSpPr>
+      <p:grpSpPr>
+        <a:xfrm>
+          <a:off x="0" y="0"/>
+          <a:ext cx="0" cy="0"/>
+          <a:chOff x="0" y="0"/>
+          <a:chExt cx="0" cy="0"/>
+        </a:xfrm>
+      </p:grpSpPr>
+      <p:sp>
+        <p:nvSpPr>
+          <p:cNvPr id="2" name="TextBox 1"/>
+          <p:cNvSpPr txBox="1"/>
+          <p:nvPr/>
+        </p:nvSpPr>
+        <p:spPr>
+          <a:xfrm>
+            <a:off x="284480" y="-5080"/>
+            <a:ext cx="7686720" cy="369332"/>
+          </a:xfrm>
+          <a:prstGeom prst="rect">
+            <a:avLst/>
+          </a:prstGeom>
+          <a:noFill/>
+        </p:spPr>
+        <p:txBody>
+          <a:bodyPr wrap="none" rtlCol="0">
+            <a:spAutoFit/>
+          </a:bodyPr>
+          <a:lstStyle/>
+          <a:p>
+            <a:r>
+              <a:rPr lang="en-US" dirty="0">
+                <a:latin typeface="Arial" panose="020B0604020202020204" pitchFamily="34" charset="0"/>
+                <a:cs typeface="Arial" panose="020B0604020202020204" pitchFamily="34" charset="0"/>
+              </a:rPr>
+              <a:t>Single-threaded test cases are straight-forward (as the book points out…)</a:t>
+            </a:r>
+          </a:p>
+        </p:txBody>
+      </p:sp>
+      <p:pic>
+        <p:nvPicPr>
+          <p:cNvPr id="3" name="Picture 2"/>
+          <p:cNvPicPr>
+            <a:picLocks noChangeAspect="1"/>
+          </p:cNvPicPr>
+          <p:nvPr/>
+        </p:nvPicPr>
+        <p:blipFill>
+          <a:blip r:embed="rId2"/>
+          <a:stretch>
+            <a:fillRect/>
+          </a:stretch>
+        </p:blipFill>
+        <p:spPr>
+          <a:xfrm>
+            <a:off x="526609" y="574531"/>
+            <a:ext cx="5715183" cy="1367821"/>
+          </a:xfrm>
+          <a:prstGeom prst="rect">
+            <a:avLst/>
+          </a:prstGeom>
+        </p:spPr>
+      </p:pic>
+      <p:pic>
+        <p:nvPicPr>
+          <p:cNvPr id="4" name="Picture 3"/>
+          <p:cNvPicPr>
+            <a:picLocks noChangeAspect="1"/>
+          </p:cNvPicPr>
+          <p:nvPr/>
+        </p:nvPicPr>
+        <p:blipFill>
+          <a:blip r:embed="rId3"/>
+          <a:stretch>
+            <a:fillRect/>
+          </a:stretch>
+        </p:blipFill>
+        <p:spPr>
+          <a:xfrm>
+            <a:off x="3594287" y="1712653"/>
+            <a:ext cx="8309623" cy="5145347"/>
+          </a:xfrm>
+          <a:prstGeom prst="rect">
+            <a:avLst/>
+          </a:prstGeom>
+        </p:spPr>
+      </p:pic>
+      <p:cxnSp>
+        <p:nvCxnSpPr>
+          <p:cNvPr id="6" name="Straight Connector 5"/>
+          <p:cNvCxnSpPr/>
+          <p:nvPr/>
+        </p:nvCxnSpPr>
+        <p:spPr>
+          <a:xfrm>
+            <a:off x="3328894" y="1583765"/>
+            <a:ext cx="8486588" cy="0"/>
+          </a:xfrm>
+          <a:prstGeom prst="line">
+            <a:avLst/>
+          </a:prstGeom>
+        </p:spPr>
+        <p:style>
+          <a:lnRef idx="1">
+            <a:schemeClr val="accent1"/>
+          </a:lnRef>
+          <a:fillRef idx="0">
+            <a:schemeClr val="accent1"/>
+          </a:fillRef>
+          <a:effectRef idx="0">
+            <a:schemeClr val="accent1"/>
+          </a:effectRef>
+          <a:fontRef idx="minor">
+            <a:schemeClr val="tx1"/>
+          </a:fontRef>
+        </p:style>
+      </p:cxnSp>
+      <p:cxnSp>
+        <p:nvCxnSpPr>
+          <p:cNvPr id="8" name="Straight Connector 7"/>
+          <p:cNvCxnSpPr/>
+          <p:nvPr/>
+        </p:nvCxnSpPr>
+        <p:spPr>
+          <a:xfrm>
+            <a:off x="3286760" y="1569720"/>
+            <a:ext cx="0" cy="5019040"/>
+          </a:xfrm>
+          <a:prstGeom prst="line">
+            <a:avLst/>
+          </a:prstGeom>
+        </p:spPr>
+        <p:style>
+          <a:lnRef idx="1">
+            <a:schemeClr val="accent1"/>
+          </a:lnRef>
+          <a:fillRef idx="0">
+            <a:schemeClr val="accent1"/>
+          </a:fillRef>
+          <a:effectRef idx="0">
+            <a:schemeClr val="accent1"/>
+          </a:effectRef>
+          <a:fontRef idx="minor">
+            <a:schemeClr val="tx1"/>
+          </a:fontRef>
+        </p:style>
+      </p:cxnSp>
+      <p:cxnSp>
+        <p:nvCxnSpPr>
+          <p:cNvPr id="12" name="Straight Connector 11"/>
+          <p:cNvCxnSpPr/>
+          <p:nvPr/>
+        </p:nvCxnSpPr>
+        <p:spPr>
+          <a:xfrm>
+            <a:off x="71120" y="1981200"/>
+            <a:ext cx="3257774" cy="0"/>
+          </a:xfrm>
+          <a:prstGeom prst="line">
+            <a:avLst/>
+          </a:prstGeom>
+        </p:spPr>
+        <p:style>
+          <a:lnRef idx="1">
+            <a:schemeClr val="accent1"/>
+          </a:lnRef>
+          <a:fillRef idx="0">
+            <a:schemeClr val="accent1"/>
+          </a:fillRef>
+          <a:effectRef idx="0">
+            <a:schemeClr val="accent1"/>
+          </a:effectRef>
+          <a:fontRef idx="minor">
+            <a:schemeClr val="tx1"/>
+          </a:fontRef>
+        </p:style>
+      </p:cxnSp>
+      <p:pic>
+        <p:nvPicPr>
+          <p:cNvPr id="13" name="Picture 12"/>
+          <p:cNvPicPr>
+            <a:picLocks noChangeAspect="1"/>
+          </p:cNvPicPr>
+          <p:nvPr/>
+        </p:nvPicPr>
+        <p:blipFill>
+          <a:blip r:embed="rId4"/>
+          <a:stretch>
+            <a:fillRect/>
+          </a:stretch>
+        </p:blipFill>
+        <p:spPr>
+          <a:xfrm>
+            <a:off x="71120" y="2097743"/>
+            <a:ext cx="3163805" cy="2151528"/>
+          </a:xfrm>
+          <a:prstGeom prst="rect">
+            <a:avLst/>
+          </a:prstGeom>
+        </p:spPr>
+      </p:pic>
+    </p:spTree>
+    <p:extLst>
+      <p:ext uri="{BB962C8B-B14F-4D97-AF65-F5344CB8AC3E}">
+        <p14:creationId xmlns:p14="http://schemas.microsoft.com/office/powerpoint/2010/main" val="2443169472"/>
       </p:ext>
     </p:extLst>
   </p:cSld>

</xml_diff>

<commit_message>
all but one example
</commit_message>
<xml_diff>
--- a/classes/prog2016/Prog3-Lecture20.pptx
+++ b/classes/prog2016/Prog3-Lecture20.pptx
@@ -5,7 +5,7 @@
     <p:sldMasterId id="2147483648" r:id="rId1"/>
   </p:sldMasterIdLst>
   <p:notesMasterIdLst>
-    <p:notesMasterId r:id="rId34"/>
+    <p:notesMasterId r:id="rId37"/>
   </p:notesMasterIdLst>
   <p:sldIdLst>
     <p:sldId id="256" r:id="rId2"/>
@@ -40,6 +40,9 @@
     <p:sldId id="286" r:id="rId31"/>
     <p:sldId id="287" r:id="rId32"/>
     <p:sldId id="288" r:id="rId33"/>
+    <p:sldId id="289" r:id="rId34"/>
+    <p:sldId id="290" r:id="rId35"/>
+    <p:sldId id="291" r:id="rId36"/>
   </p:sldIdLst>
   <p:sldSz cx="12192000" cy="6858000"/>
   <p:notesSz cx="6858000" cy="9144000"/>
@@ -5757,7 +5760,7 @@
           <a:graphicData uri="http://schemas.openxmlformats.org/presentationml/2006/ole">
             <mc:AlternateContent xmlns:mc="http://schemas.openxmlformats.org/markup-compatibility/2006">
               <mc:Choice xmlns:v="urn:schemas-microsoft-com:vml" Requires="v">
-                <p:oleObj spid="_x0000_s1045" name="Bitmap Image" r:id="rId4" imgW="4361905" imgH="2905531" progId="Paint.Picture">
+                <p:oleObj spid="_x0000_s1056" name="Bitmap Image" r:id="rId4" imgW="4361905" imgH="2905531" progId="Paint.Picture">
                   <p:embed/>
                 </p:oleObj>
               </mc:Choice>
@@ -5982,7 +5985,7 @@
           <a:graphicData uri="http://schemas.openxmlformats.org/presentationml/2006/ole">
             <mc:AlternateContent xmlns:mc="http://schemas.openxmlformats.org/markup-compatibility/2006">
               <mc:Choice xmlns:v="urn:schemas-microsoft-com:vml" Requires="v">
-                <p:oleObj spid="_x0000_s2069" name="Bitmap Image" r:id="rId4" imgW="6533333" imgH="5057143" progId="Paint.Picture">
+                <p:oleObj spid="_x0000_s2080" name="Bitmap Image" r:id="rId4" imgW="6533333" imgH="5057143" progId="Paint.Picture">
                   <p:embed/>
                 </p:oleObj>
               </mc:Choice>
@@ -6168,7 +6171,7 @@
           <a:graphicData uri="http://schemas.openxmlformats.org/presentationml/2006/ole">
             <mc:AlternateContent xmlns:mc="http://schemas.openxmlformats.org/markup-compatibility/2006">
               <mc:Choice xmlns:v="urn:schemas-microsoft-com:vml" Requires="v">
-                <p:oleObj spid="_x0000_s3093" name="Bitmap Image" r:id="rId4" imgW="7935433" imgH="4067743" progId="Paint.Picture">
+                <p:oleObj spid="_x0000_s3104" name="Bitmap Image" r:id="rId4" imgW="7935433" imgH="4067743" progId="Paint.Picture">
                   <p:embed/>
                 </p:oleObj>
               </mc:Choice>
@@ -6354,7 +6357,7 @@
           <a:graphicData uri="http://schemas.openxmlformats.org/presentationml/2006/ole">
             <mc:AlternateContent xmlns:mc="http://schemas.openxmlformats.org/markup-compatibility/2006">
               <mc:Choice xmlns:v="urn:schemas-microsoft-com:vml" Requires="v">
-                <p:oleObj spid="_x0000_s4117" name="Bitmap Image" r:id="rId4" imgW="6628571" imgH="6552381" progId="Paint.Picture">
+                <p:oleObj spid="_x0000_s4128" name="Bitmap Image" r:id="rId4" imgW="6628571" imgH="6552381" progId="Paint.Picture">
                   <p:embed/>
                 </p:oleObj>
               </mc:Choice>
@@ -7151,10 +7154,6 @@
               </a:rPr>
               <a:t>https://github.com/afodor/metagenomicsTools/blob/master/src/classExamples/boundedBuffer/SemaphoreBoundedBuffer.java</a:t>
             </a:r>
-            <a:endParaRPr lang="en-US" sz="1200" dirty="0">
-              <a:latin typeface="Arial" panose="020B0604020202020204" pitchFamily="34" charset="0"/>
-              <a:cs typeface="Arial" panose="020B0604020202020204" pitchFamily="34" charset="0"/>
-            </a:endParaRPr>
           </a:p>
         </p:txBody>
       </p:sp>
@@ -7496,6 +7495,548 @@
     <p:extLst>
       <p:ext uri="{BB962C8B-B14F-4D97-AF65-F5344CB8AC3E}">
         <p14:creationId xmlns:p14="http://schemas.microsoft.com/office/powerpoint/2010/main" val="2443169472"/>
+      </p:ext>
+    </p:extLst>
+  </p:cSld>
+  <p:clrMapOvr>
+    <a:masterClrMapping/>
+  </p:clrMapOvr>
+</p:sld>
+</file>
+
+<file path=ppt/slides/slide33.xml><?xml version="1.0" encoding="utf-8"?>
+<p:sld xmlns:a="http://schemas.openxmlformats.org/drawingml/2006/main" xmlns:r="http://schemas.openxmlformats.org/officeDocument/2006/relationships" xmlns:p="http://schemas.openxmlformats.org/presentationml/2006/main">
+  <p:cSld>
+    <p:spTree>
+      <p:nvGrpSpPr>
+        <p:cNvPr id="1" name=""/>
+        <p:cNvGrpSpPr/>
+        <p:nvPr/>
+      </p:nvGrpSpPr>
+      <p:grpSpPr>
+        <a:xfrm>
+          <a:off x="0" y="0"/>
+          <a:ext cx="0" cy="0"/>
+          <a:chOff x="0" y="0"/>
+          <a:chExt cx="0" cy="0"/>
+        </a:xfrm>
+      </p:grpSpPr>
+      <p:sp>
+        <p:nvSpPr>
+          <p:cNvPr id="2" name="Rectangle 1"/>
+          <p:cNvSpPr/>
+          <p:nvPr/>
+        </p:nvSpPr>
+        <p:spPr>
+          <a:xfrm>
+            <a:off x="111760" y="6478955"/>
+            <a:ext cx="12359640" cy="369332"/>
+          </a:xfrm>
+          <a:prstGeom prst="rect">
+            <a:avLst/>
+          </a:prstGeom>
+        </p:spPr>
+        <p:txBody>
+          <a:bodyPr wrap="square">
+            <a:spAutoFit/>
+          </a:bodyPr>
+          <a:lstStyle/>
+          <a:p>
+            <a:r>
+              <a:rPr lang="en-US" dirty="0"/>
+              <a:t>https://github.com/afodor/metagenomicsTools/blob/master/src/classExamples/boundedBuffer/MultiThreadedTestUnits.java</a:t>
+            </a:r>
+            <a:endParaRPr lang="en-US" dirty="0"/>
+          </a:p>
+        </p:txBody>
+      </p:sp>
+      <p:sp>
+        <p:nvSpPr>
+          <p:cNvPr id="3" name="TextBox 2"/>
+          <p:cNvSpPr txBox="1"/>
+          <p:nvPr/>
+        </p:nvSpPr>
+        <p:spPr>
+          <a:xfrm>
+            <a:off x="345440" y="-106680"/>
+            <a:ext cx="11055142" cy="369332"/>
+          </a:xfrm>
+          <a:prstGeom prst="rect">
+            <a:avLst/>
+          </a:prstGeom>
+          <a:noFill/>
+        </p:spPr>
+        <p:txBody>
+          <a:bodyPr wrap="none" rtlCol="0">
+            <a:spAutoFit/>
+          </a:bodyPr>
+          <a:lstStyle/>
+          <a:p>
+            <a:r>
+              <a:rPr lang="en-US" dirty="0"/>
+              <a:t>Multi-threaded testing is way trickier…  Here we (following an example in Ch. 11) test that take() blocks when empty</a:t>
+            </a:r>
+          </a:p>
+        </p:txBody>
+      </p:sp>
+      <p:pic>
+        <p:nvPicPr>
+          <p:cNvPr id="4" name="Picture 3"/>
+          <p:cNvPicPr>
+            <a:picLocks noChangeAspect="1"/>
+          </p:cNvPicPr>
+          <p:nvPr/>
+        </p:nvPicPr>
+        <p:blipFill>
+          <a:blip r:embed="rId2"/>
+          <a:stretch>
+            <a:fillRect/>
+          </a:stretch>
+        </p:blipFill>
+        <p:spPr>
+          <a:xfrm>
+            <a:off x="1036250" y="208280"/>
+            <a:ext cx="6903790" cy="5032385"/>
+          </a:xfrm>
+          <a:prstGeom prst="rect">
+            <a:avLst/>
+          </a:prstGeom>
+        </p:spPr>
+      </p:pic>
+      <p:pic>
+        <p:nvPicPr>
+          <p:cNvPr id="5" name="Picture 4"/>
+          <p:cNvPicPr>
+            <a:picLocks noChangeAspect="1"/>
+          </p:cNvPicPr>
+          <p:nvPr/>
+        </p:nvPicPr>
+        <p:blipFill>
+          <a:blip r:embed="rId3"/>
+          <a:stretch>
+            <a:fillRect/>
+          </a:stretch>
+        </p:blipFill>
+        <p:spPr>
+          <a:xfrm>
+            <a:off x="1107989" y="5254041"/>
+            <a:ext cx="3809451" cy="1215051"/>
+          </a:xfrm>
+          <a:prstGeom prst="rect">
+            <a:avLst/>
+          </a:prstGeom>
+        </p:spPr>
+      </p:pic>
+      <p:cxnSp>
+        <p:nvCxnSpPr>
+          <p:cNvPr id="7" name="Straight Arrow Connector 6"/>
+          <p:cNvCxnSpPr/>
+          <p:nvPr/>
+        </p:nvCxnSpPr>
+        <p:spPr>
+          <a:xfrm flipH="1">
+            <a:off x="5415280" y="3728720"/>
+            <a:ext cx="919480" cy="0"/>
+          </a:xfrm>
+          <a:prstGeom prst="straightConnector1">
+            <a:avLst/>
+          </a:prstGeom>
+          <a:ln>
+            <a:tailEnd type="triangle"/>
+          </a:ln>
+        </p:spPr>
+        <p:style>
+          <a:lnRef idx="1">
+            <a:schemeClr val="accent1"/>
+          </a:lnRef>
+          <a:fillRef idx="0">
+            <a:schemeClr val="accent1"/>
+          </a:fillRef>
+          <a:effectRef idx="0">
+            <a:schemeClr val="accent1"/>
+          </a:effectRef>
+          <a:fontRef idx="minor">
+            <a:schemeClr val="tx1"/>
+          </a:fontRef>
+        </p:style>
+      </p:cxnSp>
+      <p:sp>
+        <p:nvSpPr>
+          <p:cNvPr id="9" name="TextBox 8"/>
+          <p:cNvSpPr txBox="1"/>
+          <p:nvPr/>
+        </p:nvSpPr>
+        <p:spPr>
+          <a:xfrm>
+            <a:off x="6385560" y="3576320"/>
+            <a:ext cx="1568058" cy="307777"/>
+          </a:xfrm>
+          <a:prstGeom prst="rect">
+            <a:avLst/>
+          </a:prstGeom>
+          <a:noFill/>
+        </p:spPr>
+        <p:txBody>
+          <a:bodyPr wrap="none" rtlCol="0">
+            <a:spAutoFit/>
+          </a:bodyPr>
+          <a:lstStyle/>
+          <a:p>
+            <a:r>
+              <a:rPr lang="en-US" sz="1400" dirty="0">
+                <a:latin typeface="Arial" panose="020B0604020202020204" pitchFamily="34" charset="0"/>
+                <a:cs typeface="Arial" panose="020B0604020202020204" pitchFamily="34" charset="0"/>
+              </a:rPr>
+              <a:t>This should block</a:t>
+            </a:r>
+          </a:p>
+        </p:txBody>
+      </p:sp>
+      <p:cxnSp>
+        <p:nvCxnSpPr>
+          <p:cNvPr id="10" name="Straight Arrow Connector 9"/>
+          <p:cNvCxnSpPr>
+            <a:cxnSpLocks/>
+          </p:cNvCxnSpPr>
+          <p:nvPr/>
+        </p:nvCxnSpPr>
+        <p:spPr>
+          <a:xfrm flipH="1" flipV="1">
+            <a:off x="4363720" y="5613400"/>
+            <a:ext cx="868680" cy="25400"/>
+          </a:xfrm>
+          <a:prstGeom prst="straightConnector1">
+            <a:avLst/>
+          </a:prstGeom>
+          <a:ln>
+            <a:tailEnd type="triangle"/>
+          </a:ln>
+        </p:spPr>
+        <p:style>
+          <a:lnRef idx="1">
+            <a:schemeClr val="accent1"/>
+          </a:lnRef>
+          <a:fillRef idx="0">
+            <a:schemeClr val="accent1"/>
+          </a:fillRef>
+          <a:effectRef idx="0">
+            <a:schemeClr val="accent1"/>
+          </a:effectRef>
+          <a:fontRef idx="minor">
+            <a:schemeClr val="tx1"/>
+          </a:fontRef>
+        </p:style>
+      </p:cxnSp>
+      <p:sp>
+        <p:nvSpPr>
+          <p:cNvPr id="11" name="TextBox 10"/>
+          <p:cNvSpPr txBox="1"/>
+          <p:nvPr/>
+        </p:nvSpPr>
+        <p:spPr>
+          <a:xfrm>
+            <a:off x="5334000" y="5461000"/>
+            <a:ext cx="2346861" cy="307777"/>
+          </a:xfrm>
+          <a:prstGeom prst="rect">
+            <a:avLst/>
+          </a:prstGeom>
+          <a:noFill/>
+        </p:spPr>
+        <p:txBody>
+          <a:bodyPr wrap="square" rtlCol="0">
+            <a:spAutoFit/>
+          </a:bodyPr>
+          <a:lstStyle/>
+          <a:p>
+            <a:r>
+              <a:rPr lang="en-US" sz="1400" dirty="0">
+                <a:latin typeface="Arial" panose="020B0604020202020204" pitchFamily="34" charset="0"/>
+                <a:cs typeface="Arial" panose="020B0604020202020204" pitchFamily="34" charset="0"/>
+              </a:rPr>
+              <a:t>Wait for blocking to happen</a:t>
+            </a:r>
+          </a:p>
+        </p:txBody>
+      </p:sp>
+      <p:cxnSp>
+        <p:nvCxnSpPr>
+          <p:cNvPr id="13" name="Straight Arrow Connector 12"/>
+          <p:cNvCxnSpPr>
+            <a:cxnSpLocks/>
+          </p:cNvCxnSpPr>
+          <p:nvPr/>
+        </p:nvCxnSpPr>
+        <p:spPr>
+          <a:xfrm flipH="1" flipV="1">
+            <a:off x="3901440" y="6096000"/>
+            <a:ext cx="868680" cy="25400"/>
+          </a:xfrm>
+          <a:prstGeom prst="straightConnector1">
+            <a:avLst/>
+          </a:prstGeom>
+          <a:ln>
+            <a:tailEnd type="triangle"/>
+          </a:ln>
+        </p:spPr>
+        <p:style>
+          <a:lnRef idx="1">
+            <a:schemeClr val="accent1"/>
+          </a:lnRef>
+          <a:fillRef idx="0">
+            <a:schemeClr val="accent1"/>
+          </a:fillRef>
+          <a:effectRef idx="0">
+            <a:schemeClr val="accent1"/>
+          </a:effectRef>
+          <a:fontRef idx="minor">
+            <a:schemeClr val="tx1"/>
+          </a:fontRef>
+        </p:style>
+      </p:cxnSp>
+      <p:sp>
+        <p:nvSpPr>
+          <p:cNvPr id="14" name="TextBox 13"/>
+          <p:cNvSpPr txBox="1"/>
+          <p:nvPr/>
+        </p:nvSpPr>
+        <p:spPr>
+          <a:xfrm>
+            <a:off x="4871720" y="5943600"/>
+            <a:ext cx="2346861" cy="307777"/>
+          </a:xfrm>
+          <a:prstGeom prst="rect">
+            <a:avLst/>
+          </a:prstGeom>
+          <a:noFill/>
+        </p:spPr>
+        <p:txBody>
+          <a:bodyPr wrap="square" rtlCol="0">
+            <a:spAutoFit/>
+          </a:bodyPr>
+          <a:lstStyle/>
+          <a:p>
+            <a:r>
+              <a:rPr lang="en-US" sz="1400" dirty="0">
+                <a:latin typeface="Arial" panose="020B0604020202020204" pitchFamily="34" charset="0"/>
+                <a:cs typeface="Arial" panose="020B0604020202020204" pitchFamily="34" charset="0"/>
+              </a:rPr>
+              <a:t>Make sure taker has exited</a:t>
+            </a:r>
+          </a:p>
+        </p:txBody>
+      </p:sp>
+      <p:pic>
+        <p:nvPicPr>
+          <p:cNvPr id="15" name="Picture 14"/>
+          <p:cNvPicPr>
+            <a:picLocks noChangeAspect="1"/>
+          </p:cNvPicPr>
+          <p:nvPr/>
+        </p:nvPicPr>
+        <p:blipFill>
+          <a:blip r:embed="rId4"/>
+          <a:stretch>
+            <a:fillRect/>
+          </a:stretch>
+        </p:blipFill>
+        <p:spPr>
+          <a:xfrm>
+            <a:off x="6949972" y="884118"/>
+            <a:ext cx="4450610" cy="1035368"/>
+          </a:xfrm>
+          <a:prstGeom prst="rect">
+            <a:avLst/>
+          </a:prstGeom>
+        </p:spPr>
+      </p:pic>
+    </p:spTree>
+    <p:extLst>
+      <p:ext uri="{BB962C8B-B14F-4D97-AF65-F5344CB8AC3E}">
+        <p14:creationId xmlns:p14="http://schemas.microsoft.com/office/powerpoint/2010/main" val="2223565711"/>
+      </p:ext>
+    </p:extLst>
+  </p:cSld>
+  <p:clrMapOvr>
+    <a:masterClrMapping/>
+  </p:clrMapOvr>
+</p:sld>
+</file>
+
+<file path=ppt/slides/slide34.xml><?xml version="1.0" encoding="utf-8"?>
+<p:sld xmlns:a="http://schemas.openxmlformats.org/drawingml/2006/main" xmlns:r="http://schemas.openxmlformats.org/officeDocument/2006/relationships" xmlns:p="http://schemas.openxmlformats.org/presentationml/2006/main">
+  <p:cSld>
+    <p:spTree>
+      <p:nvGrpSpPr>
+        <p:cNvPr id="1" name=""/>
+        <p:cNvGrpSpPr/>
+        <p:nvPr/>
+      </p:nvGrpSpPr>
+      <p:grpSpPr>
+        <a:xfrm>
+          <a:off x="0" y="0"/>
+          <a:ext cx="0" cy="0"/>
+          <a:chOff x="0" y="0"/>
+          <a:chExt cx="0" cy="0"/>
+        </a:xfrm>
+      </p:grpSpPr>
+      <p:pic>
+        <p:nvPicPr>
+          <p:cNvPr id="2" name="Picture 1"/>
+          <p:cNvPicPr>
+            <a:picLocks noChangeAspect="1"/>
+          </p:cNvPicPr>
+          <p:nvPr/>
+        </p:nvPicPr>
+        <p:blipFill>
+          <a:blip r:embed="rId2"/>
+          <a:stretch>
+            <a:fillRect/>
+          </a:stretch>
+        </p:blipFill>
+        <p:spPr>
+          <a:xfrm>
+            <a:off x="0" y="2236454"/>
+            <a:ext cx="12192000" cy="2385092"/>
+          </a:xfrm>
+          <a:prstGeom prst="rect">
+            <a:avLst/>
+          </a:prstGeom>
+        </p:spPr>
+      </p:pic>
+      <p:sp>
+        <p:nvSpPr>
+          <p:cNvPr id="3" name="Rectangle 2"/>
+          <p:cNvSpPr/>
+          <p:nvPr/>
+        </p:nvSpPr>
+        <p:spPr>
+          <a:xfrm>
+            <a:off x="3048000" y="6118275"/>
+            <a:ext cx="8260080" cy="369332"/>
+          </a:xfrm>
+          <a:prstGeom prst="rect">
+            <a:avLst/>
+          </a:prstGeom>
+        </p:spPr>
+        <p:txBody>
+          <a:bodyPr wrap="square">
+            <a:spAutoFit/>
+          </a:bodyPr>
+          <a:lstStyle/>
+          <a:p>
+            <a:r>
+              <a:rPr lang="en-US" dirty="0"/>
+              <a:t>https://docs.oracle.com/javase/tutorial/essential/concurrency/join.html</a:t>
+            </a:r>
+            <a:endParaRPr lang="en-US" dirty="0"/>
+          </a:p>
+        </p:txBody>
+      </p:sp>
+      <p:sp>
+        <p:nvSpPr>
+          <p:cNvPr id="4" name="TextBox 3"/>
+          <p:cNvSpPr txBox="1"/>
+          <p:nvPr/>
+        </p:nvSpPr>
+        <p:spPr>
+          <a:xfrm>
+            <a:off x="965200" y="457200"/>
+            <a:ext cx="8152938" cy="1200329"/>
+          </a:xfrm>
+          <a:prstGeom prst="rect">
+            <a:avLst/>
+          </a:prstGeom>
+          <a:noFill/>
+        </p:spPr>
+        <p:txBody>
+          <a:bodyPr wrap="none" rtlCol="0">
+            <a:spAutoFit/>
+          </a:bodyPr>
+          <a:lstStyle/>
+          <a:p>
+            <a:r>
+              <a:rPr lang="en-US" dirty="0">
+                <a:latin typeface="Arial" panose="020B0604020202020204" pitchFamily="34" charset="0"/>
+                <a:cs typeface="Arial" panose="020B0604020202020204" pitchFamily="34" charset="0"/>
+              </a:rPr>
+              <a:t>Our </a:t>
+            </a:r>
+            <a:r>
+              <a:rPr lang="en-US" dirty="0" err="1">
+                <a:latin typeface="Arial" panose="020B0604020202020204" pitchFamily="34" charset="0"/>
+                <a:cs typeface="Arial" panose="020B0604020202020204" pitchFamily="34" charset="0"/>
+              </a:rPr>
+              <a:t>taker.join</a:t>
+            </a:r>
+            <a:r>
+              <a:rPr lang="en-US" dirty="0">
+                <a:latin typeface="Arial" panose="020B0604020202020204" pitchFamily="34" charset="0"/>
+                <a:cs typeface="Arial" panose="020B0604020202020204" pitchFamily="34" charset="0"/>
+              </a:rPr>
+              <a:t>( TIMEOUT ) says wait in this thread for the other thread to finish</a:t>
+            </a:r>
+          </a:p>
+          <a:p>
+            <a:r>
+              <a:rPr lang="en-US" dirty="0">
+                <a:latin typeface="Arial" panose="020B0604020202020204" pitchFamily="34" charset="0"/>
+                <a:cs typeface="Arial" panose="020B0604020202020204" pitchFamily="34" charset="0"/>
+              </a:rPr>
+              <a:t>(or give up on waiting after TIMEOUT)</a:t>
+            </a:r>
+          </a:p>
+          <a:p>
+            <a:endParaRPr lang="en-US" dirty="0">
+              <a:latin typeface="Arial" panose="020B0604020202020204" pitchFamily="34" charset="0"/>
+              <a:cs typeface="Arial" panose="020B0604020202020204" pitchFamily="34" charset="0"/>
+            </a:endParaRPr>
+          </a:p>
+          <a:p>
+            <a:r>
+              <a:rPr lang="en-US" dirty="0">
+                <a:latin typeface="Arial" panose="020B0604020202020204" pitchFamily="34" charset="0"/>
+                <a:cs typeface="Arial" panose="020B0604020202020204" pitchFamily="34" charset="0"/>
+              </a:rPr>
+              <a:t>We fail in the testing thread if the join() exited because of the TIMEOUT</a:t>
+            </a:r>
+          </a:p>
+        </p:txBody>
+      </p:sp>
+    </p:spTree>
+    <p:extLst>
+      <p:ext uri="{BB962C8B-B14F-4D97-AF65-F5344CB8AC3E}">
+        <p14:creationId xmlns:p14="http://schemas.microsoft.com/office/powerpoint/2010/main" val="519693715"/>
+      </p:ext>
+    </p:extLst>
+  </p:cSld>
+  <p:clrMapOvr>
+    <a:masterClrMapping/>
+  </p:clrMapOvr>
+</p:sld>
+</file>
+
+<file path=ppt/slides/slide35.xml><?xml version="1.0" encoding="utf-8"?>
+<p:sld xmlns:a="http://schemas.openxmlformats.org/drawingml/2006/main" xmlns:r="http://schemas.openxmlformats.org/officeDocument/2006/relationships" xmlns:p="http://schemas.openxmlformats.org/presentationml/2006/main">
+  <p:cSld>
+    <p:spTree>
+      <p:nvGrpSpPr>
+        <p:cNvPr id="1" name=""/>
+        <p:cNvGrpSpPr/>
+        <p:nvPr/>
+      </p:nvGrpSpPr>
+      <p:grpSpPr>
+        <a:xfrm>
+          <a:off x="0" y="0"/>
+          <a:ext cx="0" cy="0"/>
+          <a:chOff x="0" y="0"/>
+          <a:chExt cx="0" cy="0"/>
+        </a:xfrm>
+      </p:grpSpPr>
+    </p:spTree>
+    <p:extLst>
+      <p:ext uri="{BB962C8B-B14F-4D97-AF65-F5344CB8AC3E}">
+        <p14:creationId xmlns:p14="http://schemas.microsoft.com/office/powerpoint/2010/main" val="2420749765"/>
       </p:ext>
     </p:extLst>
   </p:cSld>

</xml_diff>